<commit_message>
test << update readmy << update Algorithm Ykkonena.pptx
</commit_message>
<xml_diff>
--- a/Algorithm Ykkonena.pptx
+++ b/Algorithm Ykkonena.pptx
@@ -5,12 +5,12 @@
     <p:sldMasterId id="2147483648" r:id="rId1"/>
   </p:sldMasterIdLst>
   <p:notesMasterIdLst>
-    <p:notesMasterId r:id="rId24"/>
+    <p:notesMasterId r:id="rId25"/>
   </p:notesMasterIdLst>
   <p:sldIdLst>
     <p:sldId id="256" r:id="rId2"/>
-    <p:sldId id="257" r:id="rId3"/>
-    <p:sldId id="282" r:id="rId4"/>
+    <p:sldId id="282" r:id="rId3"/>
+    <p:sldId id="257" r:id="rId4"/>
     <p:sldId id="258" r:id="rId5"/>
     <p:sldId id="259" r:id="rId6"/>
     <p:sldId id="260" r:id="rId7"/>
@@ -21,15 +21,16 @@
     <p:sldId id="265" r:id="rId12"/>
     <p:sldId id="266" r:id="rId13"/>
     <p:sldId id="267" r:id="rId14"/>
-    <p:sldId id="268" r:id="rId15"/>
-    <p:sldId id="274" r:id="rId16"/>
-    <p:sldId id="275" r:id="rId17"/>
-    <p:sldId id="276" r:id="rId18"/>
-    <p:sldId id="277" r:id="rId19"/>
-    <p:sldId id="278" r:id="rId20"/>
-    <p:sldId id="279" r:id="rId21"/>
-    <p:sldId id="280" r:id="rId22"/>
-    <p:sldId id="281" r:id="rId23"/>
+    <p:sldId id="283" r:id="rId15"/>
+    <p:sldId id="268" r:id="rId16"/>
+    <p:sldId id="274" r:id="rId17"/>
+    <p:sldId id="275" r:id="rId18"/>
+    <p:sldId id="276" r:id="rId19"/>
+    <p:sldId id="277" r:id="rId20"/>
+    <p:sldId id="278" r:id="rId21"/>
+    <p:sldId id="279" r:id="rId22"/>
+    <p:sldId id="280" r:id="rId23"/>
+    <p:sldId id="281" r:id="rId24"/>
   </p:sldIdLst>
   <p:sldSz cx="12192000" cy="6858000"/>
   <p:notesSz cx="6858000" cy="9144000"/>
@@ -1331,8 +1332,8 @@
     <dgm:cxn modelId="{130E26AE-5078-4327-A0B6-BD41DEFBDCDC}" srcId="{430D2A41-4096-48FB-AC9A-ABC421E551AA}" destId="{60FB0EF1-8906-41E0-B83D-5278835EE39E}" srcOrd="1" destOrd="0" parTransId="{49717DCB-B828-42DA-843B-EF1D18A17E0E}" sibTransId="{145B1491-06F8-4D1D-8FA4-8B664CEA8183}"/>
     <dgm:cxn modelId="{01A7F8AE-08AC-4ED7-BA0C-3B2630252BF6}" type="presOf" srcId="{430D2A41-4096-48FB-AC9A-ABC421E551AA}" destId="{5C3F36AE-6A64-46DF-B628-A091161949CA}" srcOrd="0" destOrd="0" presId="urn:microsoft.com/office/officeart/2005/8/layout/vList2"/>
     <dgm:cxn modelId="{C40AF7BA-C6C1-409A-B2B6-4BD4C6E999AB}" type="presOf" srcId="{B2FCE55C-64CC-4095-89E5-AC6EE35CCECE}" destId="{B8B73F11-5DA3-497C-BC08-8A91A3589049}" srcOrd="0" destOrd="0" presId="urn:microsoft.com/office/officeart/2005/8/layout/vList2"/>
+    <dgm:cxn modelId="{24C3D8E4-064E-4CD2-8821-D0DE50A1B8DA}" type="presOf" srcId="{0017F1B2-D95F-4F71-A3D6-5C2774B0ECA2}" destId="{6BA81DAA-A1D8-4DB0-A077-907865576BA1}" srcOrd="0" destOrd="0" presId="urn:microsoft.com/office/officeart/2005/8/layout/vList2"/>
     <dgm:cxn modelId="{8DE590D6-A48E-4BAB-BEC6-F9009A8951BA}" type="presOf" srcId="{20977FF0-9868-4FC9-90FD-6F847EC24436}" destId="{BA1DA39A-1217-4B11-A746-5D160FDA5879}" srcOrd="0" destOrd="0" presId="urn:microsoft.com/office/officeart/2005/8/layout/vList2"/>
-    <dgm:cxn modelId="{24C3D8E4-064E-4CD2-8821-D0DE50A1B8DA}" type="presOf" srcId="{0017F1B2-D95F-4F71-A3D6-5C2774B0ECA2}" destId="{6BA81DAA-A1D8-4DB0-A077-907865576BA1}" srcOrd="0" destOrd="0" presId="urn:microsoft.com/office/officeart/2005/8/layout/vList2"/>
     <dgm:cxn modelId="{3373C87D-97B0-4A4B-A36D-16D1032E7BC6}" type="presParOf" srcId="{5C3F36AE-6A64-46DF-B628-A091161949CA}" destId="{3EBDB24F-A150-430D-8285-DC9082797A97}" srcOrd="0" destOrd="0" presId="urn:microsoft.com/office/officeart/2005/8/layout/vList2"/>
     <dgm:cxn modelId="{D528A201-0590-464F-97FC-2919F81CA71B}" type="presParOf" srcId="{5C3F36AE-6A64-46DF-B628-A091161949CA}" destId="{A9FCC314-7387-4D47-AE3D-35AD8C083328}" srcOrd="1" destOrd="0" presId="urn:microsoft.com/office/officeart/2005/8/layout/vList2"/>
     <dgm:cxn modelId="{1CECFAEE-2C31-4A66-8144-E65768026AA1}" type="presParOf" srcId="{5C3F36AE-6A64-46DF-B628-A091161949CA}" destId="{54B347B8-8D4C-41F1-B8D8-1914A868290F}" srcOrd="2" destOrd="0" presId="urn:microsoft.com/office/officeart/2005/8/layout/vList2"/>
@@ -3251,7 +3252,7 @@
           <a:p>
             <a:fld id="{D7D411B8-925D-4A43-88D4-1AB25980BAD3}" type="datetimeFigureOut">
               <a:rPr lang="ru-RU" smtClean="0"/>
-              <a:t>10.01.2023</a:t>
+              <a:t>25.01.2023</a:t>
             </a:fld>
             <a:endParaRPr lang="ru-RU"/>
           </a:p>
@@ -3602,6 +3603,90 @@
 </p:notes>
 </file>
 
+<file path=ppt/notesSlides/notesSlide2.xml><?xml version="1.0" encoding="utf-8"?>
+<p:notes xmlns:a="http://schemas.openxmlformats.org/drawingml/2006/main" xmlns:r="http://schemas.openxmlformats.org/officeDocument/2006/relationships" xmlns:p="http://schemas.openxmlformats.org/presentationml/2006/main">
+  <p:cSld>
+    <p:spTree>
+      <p:nvGrpSpPr>
+        <p:cNvPr id="1" name=""/>
+        <p:cNvGrpSpPr/>
+        <p:nvPr/>
+      </p:nvGrpSpPr>
+      <p:grpSpPr>
+        <a:xfrm>
+          <a:off x="0" y="0"/>
+          <a:ext cx="0" cy="0"/>
+          <a:chOff x="0" y="0"/>
+          <a:chExt cx="0" cy="0"/>
+        </a:xfrm>
+      </p:grpSpPr>
+      <p:sp>
+        <p:nvSpPr>
+          <p:cNvPr id="2" name="Образ слайда 1"/>
+          <p:cNvSpPr>
+            <a:spLocks noGrp="1" noRot="1" noChangeAspect="1"/>
+          </p:cNvSpPr>
+          <p:nvPr>
+            <p:ph type="sldImg"/>
+          </p:nvPr>
+        </p:nvSpPr>
+        <p:spPr/>
+      </p:sp>
+      <p:sp>
+        <p:nvSpPr>
+          <p:cNvPr id="3" name="Заметки 2"/>
+          <p:cNvSpPr>
+            <a:spLocks noGrp="1"/>
+          </p:cNvSpPr>
+          <p:nvPr>
+            <p:ph type="body" idx="1"/>
+          </p:nvPr>
+        </p:nvSpPr>
+        <p:spPr/>
+        <p:txBody>
+          <a:bodyPr/>
+          <a:lstStyle/>
+          <a:p>
+            <a:endParaRPr lang="ru-RU" dirty="0"/>
+          </a:p>
+        </p:txBody>
+      </p:sp>
+      <p:sp>
+        <p:nvSpPr>
+          <p:cNvPr id="4" name="Номер слайда 3"/>
+          <p:cNvSpPr>
+            <a:spLocks noGrp="1"/>
+          </p:cNvSpPr>
+          <p:nvPr>
+            <p:ph type="sldNum" sz="quarter" idx="5"/>
+          </p:nvPr>
+        </p:nvSpPr>
+        <p:spPr/>
+        <p:txBody>
+          <a:bodyPr/>
+          <a:lstStyle/>
+          <a:p>
+            <a:fld id="{23EBC69B-5345-44D2-B112-E91DC9CF7945}" type="slidenum">
+              <a:rPr lang="ru-RU" smtClean="0"/>
+              <a:t>14</a:t>
+            </a:fld>
+            <a:endParaRPr lang="ru-RU"/>
+          </a:p>
+        </p:txBody>
+      </p:sp>
+    </p:spTree>
+    <p:extLst>
+      <p:ext uri="{BB962C8B-B14F-4D97-AF65-F5344CB8AC3E}">
+        <p14:creationId xmlns:p14="http://schemas.microsoft.com/office/powerpoint/2010/main" val="3546356467"/>
+      </p:ext>
+    </p:extLst>
+  </p:cSld>
+  <p:clrMapOvr>
+    <a:masterClrMapping/>
+  </p:clrMapOvr>
+</p:notes>
+</file>
+
 <file path=ppt/slideLayouts/slideLayout1.xml><?xml version="1.0" encoding="utf-8"?>
 <p:sldLayout xmlns:a="http://schemas.openxmlformats.org/drawingml/2006/main" xmlns:r="http://schemas.openxmlformats.org/officeDocument/2006/relationships" xmlns:p="http://schemas.openxmlformats.org/presentationml/2006/main" type="title" preserve="1">
   <p:cSld name="Титульный слайд">
@@ -3749,7 +3834,7 @@
           <a:p>
             <a:fld id="{70FC7955-C5F2-4C3A-BBD7-9F6FA9C85E71}" type="datetimeFigureOut">
               <a:rPr lang="ru-RU" smtClean="0"/>
-              <a:t>10.01.2023</a:t>
+              <a:t>25.01.2023</a:t>
             </a:fld>
             <a:endParaRPr lang="ru-RU"/>
           </a:p>
@@ -3947,7 +4032,7 @@
           <a:p>
             <a:fld id="{70FC7955-C5F2-4C3A-BBD7-9F6FA9C85E71}" type="datetimeFigureOut">
               <a:rPr lang="ru-RU" smtClean="0"/>
-              <a:t>10.01.2023</a:t>
+              <a:t>25.01.2023</a:t>
             </a:fld>
             <a:endParaRPr lang="ru-RU"/>
           </a:p>
@@ -4155,7 +4240,7 @@
           <a:p>
             <a:fld id="{70FC7955-C5F2-4C3A-BBD7-9F6FA9C85E71}" type="datetimeFigureOut">
               <a:rPr lang="ru-RU" smtClean="0"/>
-              <a:t>10.01.2023</a:t>
+              <a:t>25.01.2023</a:t>
             </a:fld>
             <a:endParaRPr lang="ru-RU"/>
           </a:p>
@@ -4353,7 +4438,7 @@
           <a:p>
             <a:fld id="{70FC7955-C5F2-4C3A-BBD7-9F6FA9C85E71}" type="datetimeFigureOut">
               <a:rPr lang="ru-RU" smtClean="0"/>
-              <a:t>10.01.2023</a:t>
+              <a:t>25.01.2023</a:t>
             </a:fld>
             <a:endParaRPr lang="ru-RU"/>
           </a:p>
@@ -4628,7 +4713,7 @@
           <a:p>
             <a:fld id="{70FC7955-C5F2-4C3A-BBD7-9F6FA9C85E71}" type="datetimeFigureOut">
               <a:rPr lang="ru-RU" smtClean="0"/>
-              <a:t>10.01.2023</a:t>
+              <a:t>25.01.2023</a:t>
             </a:fld>
             <a:endParaRPr lang="ru-RU"/>
           </a:p>
@@ -4893,7 +4978,7 @@
           <a:p>
             <a:fld id="{70FC7955-C5F2-4C3A-BBD7-9F6FA9C85E71}" type="datetimeFigureOut">
               <a:rPr lang="ru-RU" smtClean="0"/>
-              <a:t>10.01.2023</a:t>
+              <a:t>25.01.2023</a:t>
             </a:fld>
             <a:endParaRPr lang="ru-RU"/>
           </a:p>
@@ -5305,7 +5390,7 @@
           <a:p>
             <a:fld id="{70FC7955-C5F2-4C3A-BBD7-9F6FA9C85E71}" type="datetimeFigureOut">
               <a:rPr lang="ru-RU" smtClean="0"/>
-              <a:t>10.01.2023</a:t>
+              <a:t>25.01.2023</a:t>
             </a:fld>
             <a:endParaRPr lang="ru-RU"/>
           </a:p>
@@ -5446,7 +5531,7 @@
           <a:p>
             <a:fld id="{70FC7955-C5F2-4C3A-BBD7-9F6FA9C85E71}" type="datetimeFigureOut">
               <a:rPr lang="ru-RU" smtClean="0"/>
-              <a:t>10.01.2023</a:t>
+              <a:t>25.01.2023</a:t>
             </a:fld>
             <a:endParaRPr lang="ru-RU"/>
           </a:p>
@@ -5559,7 +5644,7 @@
           <a:p>
             <a:fld id="{70FC7955-C5F2-4C3A-BBD7-9F6FA9C85E71}" type="datetimeFigureOut">
               <a:rPr lang="ru-RU" smtClean="0"/>
-              <a:t>10.01.2023</a:t>
+              <a:t>25.01.2023</a:t>
             </a:fld>
             <a:endParaRPr lang="ru-RU"/>
           </a:p>
@@ -5870,7 +5955,7 @@
           <a:p>
             <a:fld id="{70FC7955-C5F2-4C3A-BBD7-9F6FA9C85E71}" type="datetimeFigureOut">
               <a:rPr lang="ru-RU" smtClean="0"/>
-              <a:t>10.01.2023</a:t>
+              <a:t>25.01.2023</a:t>
             </a:fld>
             <a:endParaRPr lang="ru-RU"/>
           </a:p>
@@ -6158,7 +6243,7 @@
           <a:p>
             <a:fld id="{70FC7955-C5F2-4C3A-BBD7-9F6FA9C85E71}" type="datetimeFigureOut">
               <a:rPr lang="ru-RU" smtClean="0"/>
-              <a:t>10.01.2023</a:t>
+              <a:t>25.01.2023</a:t>
             </a:fld>
             <a:endParaRPr lang="ru-RU"/>
           </a:p>
@@ -6402,7 +6487,7 @@
           <a:p>
             <a:fld id="{70FC7955-C5F2-4C3A-BBD7-9F6FA9C85E71}" type="datetimeFigureOut">
               <a:rPr lang="ru-RU" smtClean="0"/>
-              <a:t>10.01.2023</a:t>
+              <a:t>25.01.2023</a:t>
             </a:fld>
             <a:endParaRPr lang="ru-RU"/>
           </a:p>
@@ -6837,7 +6922,7 @@
         </p:nvSpPr>
         <p:spPr>
           <a:xfrm>
-            <a:off x="1524000" y="867158"/>
+            <a:off x="1524000" y="695281"/>
             <a:ext cx="9144000" cy="2387600"/>
           </a:xfrm>
         </p:spPr>
@@ -6893,35 +6978,62 @@
         </p:nvSpPr>
         <p:spPr>
           <a:xfrm>
-            <a:off x="2920240" y="4532685"/>
-            <a:ext cx="9144000" cy="1928674"/>
+            <a:off x="2902485" y="4062167"/>
+            <a:ext cx="9144000" cy="2303121"/>
           </a:xfrm>
         </p:spPr>
         <p:txBody>
           <a:bodyPr>
-            <a:normAutofit/>
+            <a:normAutofit fontScale="32500" lnSpcReduction="20000"/>
           </a:bodyPr>
           <a:lstStyle/>
           <a:p>
             <a:pPr algn="r"/>
             <a:r>
-              <a:rPr lang="ru-RU" dirty="0"/>
+              <a:rPr lang="ru-RU" sz="7400" dirty="0"/>
               <a:t>Студент </a:t>
             </a:r>
           </a:p>
           <a:p>
             <a:pPr algn="r"/>
             <a:r>
-              <a:rPr lang="ru-RU" dirty="0"/>
+              <a:rPr lang="ru-RU" sz="7400" dirty="0"/>
               <a:t>Группы Б9121-09.03.03</a:t>
             </a:r>
           </a:p>
           <a:p>
             <a:pPr algn="r"/>
             <a:r>
-              <a:rPr lang="ru-RU" dirty="0"/>
+              <a:rPr lang="ru-RU" sz="7400" b="1" dirty="0"/>
               <a:t>Рыжков Данил Максимович</a:t>
             </a:r>
+          </a:p>
+          <a:p>
+            <a:pPr algn="r"/>
+            <a:endParaRPr lang="ru-RU" sz="7400" b="1" dirty="0"/>
+          </a:p>
+          <a:p>
+            <a:pPr algn="r"/>
+            <a:r>
+              <a:rPr lang="ru-RU" sz="7400" dirty="0"/>
+              <a:t>Руководитель</a:t>
+            </a:r>
+            <a:r>
+              <a:rPr lang="en-US" sz="7400" dirty="0"/>
+              <a:t>:</a:t>
+            </a:r>
+          </a:p>
+          <a:p>
+            <a:pPr algn="r"/>
+            <a:r>
+              <a:rPr lang="ru-RU" sz="7400" b="1" dirty="0"/>
+              <a:t>Кленин Александр Сергеевич</a:t>
+            </a:r>
+            <a:endParaRPr lang="en-US" sz="7400" b="1" dirty="0"/>
+          </a:p>
+          <a:p>
+            <a:pPr algn="r"/>
+            <a:endParaRPr lang="ru-RU" b="1" dirty="0"/>
           </a:p>
         </p:txBody>
       </p:sp>
@@ -6953,7 +7065,7 @@
         </p:blipFill>
         <p:spPr>
           <a:xfrm>
-            <a:off x="4188957" y="248177"/>
+            <a:off x="4322122" y="150522"/>
             <a:ext cx="2584192" cy="1640904"/>
           </a:xfrm>
           <a:prstGeom prst="rect">
@@ -6992,7 +7104,7 @@
             <a:pPr algn="ctr"/>
             <a:r>
               <a:rPr lang="ru-RU" dirty="0"/>
-              <a:t>2022 </a:t>
+              <a:t>2023 </a:t>
             </a:r>
           </a:p>
           <a:p>
@@ -8013,6 +8125,689 @@
 </file>
 
 <file path=ppt/slides/slide14.xml><?xml version="1.0" encoding="utf-8"?>
+<p:sld xmlns:a="http://schemas.openxmlformats.org/drawingml/2006/main" xmlns:r="http://schemas.openxmlformats.org/officeDocument/2006/relationships" xmlns:p="http://schemas.openxmlformats.org/presentationml/2006/main">
+  <p:cSld>
+    <p:bg>
+      <p:bgPr>
+        <a:noFill/>
+        <a:effectLst/>
+      </p:bgPr>
+    </p:bg>
+    <p:spTree>
+      <p:nvGrpSpPr>
+        <p:cNvPr id="1" name=""/>
+        <p:cNvGrpSpPr/>
+        <p:nvPr/>
+      </p:nvGrpSpPr>
+      <p:grpSpPr>
+        <a:xfrm>
+          <a:off x="0" y="0"/>
+          <a:ext cx="0" cy="0"/>
+          <a:chOff x="0" y="0"/>
+          <a:chExt cx="0" cy="0"/>
+        </a:xfrm>
+      </p:grpSpPr>
+      <p:sp>
+        <p:nvSpPr>
+          <p:cNvPr id="2" name="Заголовок 1">
+            <a:extLst>
+              <a:ext uri="{FF2B5EF4-FFF2-40B4-BE49-F238E27FC236}">
+                <a16:creationId xmlns:a16="http://schemas.microsoft.com/office/drawing/2014/main" id="{42666BCF-7B21-ED2A-F380-99E241ED3BF0}"/>
+              </a:ext>
+            </a:extLst>
+          </p:cNvPr>
+          <p:cNvSpPr>
+            <a:spLocks noGrp="1"/>
+          </p:cNvSpPr>
+          <p:nvPr>
+            <p:ph type="title"/>
+          </p:nvPr>
+        </p:nvSpPr>
+        <p:spPr/>
+        <p:txBody>
+          <a:bodyPr/>
+          <a:lstStyle/>
+          <a:p>
+            <a:r>
+              <a:rPr lang="ru-RU" dirty="0"/>
+              <a:t>Итоговая оценка времени работы</a:t>
+            </a:r>
+          </a:p>
+        </p:txBody>
+      </p:sp>
+      <p:sp>
+        <p:nvSpPr>
+          <p:cNvPr id="5" name="Rectangle 2">
+            <a:extLst>
+              <a:ext uri="{FF2B5EF4-FFF2-40B4-BE49-F238E27FC236}">
+                <a16:creationId xmlns:a16="http://schemas.microsoft.com/office/drawing/2014/main" id="{97D0C92F-1F93-54BC-C5C1-A047CE722A7F}"/>
+              </a:ext>
+            </a:extLst>
+          </p:cNvPr>
+          <p:cNvSpPr>
+            <a:spLocks noGrp="1" noChangeArrowheads="1"/>
+          </p:cNvSpPr>
+          <p:nvPr>
+            <p:ph idx="1"/>
+          </p:nvPr>
+        </p:nvSpPr>
+        <p:spPr bwMode="auto">
+          <a:xfrm>
+            <a:off x="314870" y="1583759"/>
+            <a:ext cx="6485425" cy="3495172"/>
+          </a:xfrm>
+          <a:prstGeom prst="rect">
+            <a:avLst/>
+          </a:prstGeom>
+          <a:noFill/>
+          <a:ln>
+            <a:noFill/>
+          </a:ln>
+          <a:effectLst/>
+          <a:extLst>
+            <a:ext uri="{909E8E84-426E-40DD-AFC4-6F175D3DCCD1}">
+              <a14:hiddenFill xmlns:a14="http://schemas.microsoft.com/office/drawing/2010/main">
+                <a:solidFill>
+                  <a:schemeClr val="accent1"/>
+                </a:solidFill>
+              </a14:hiddenFill>
+            </a:ext>
+            <a:ext uri="{91240B29-F687-4F45-9708-019B960494DF}">
+              <a14:hiddenLine xmlns:a14="http://schemas.microsoft.com/office/drawing/2010/main" w="9525">
+                <a:solidFill>
+                  <a:schemeClr val="tx1"/>
+                </a:solidFill>
+                <a:miter lim="800000"/>
+                <a:headEnd/>
+                <a:tailEnd/>
+              </a14:hiddenLine>
+            </a:ext>
+            <a:ext uri="{AF507438-7753-43E0-B8FC-AC1667EBCBE1}">
+              <a14:hiddenEffects xmlns:a14="http://schemas.microsoft.com/office/drawing/2010/main">
+                <a:effectLst>
+                  <a:outerShdw dist="35921" dir="2700000" algn="ctr" rotWithShape="0">
+                    <a:schemeClr val="bg2"/>
+                  </a:outerShdw>
+                </a:effectLst>
+              </a14:hiddenEffects>
+            </a:ext>
+          </a:extLst>
+        </p:spPr>
+        <p:txBody>
+          <a:bodyPr vert="horz" wrap="square" lIns="0" tIns="47610" rIns="0" bIns="0" numCol="1" anchor="ctr" anchorCtr="0" compatLnSpc="1">
+            <a:prstTxWarp prst="textNoShape">
+              <a:avLst/>
+            </a:prstTxWarp>
+            <a:spAutoFit/>
+          </a:bodyPr>
+          <a:lstStyle>
+            <a:lvl1pPr eaLnBrk="0" fontAlgn="base" hangingPunct="0">
+              <a:spcBef>
+                <a:spcPct val="0"/>
+              </a:spcBef>
+              <a:spcAft>
+                <a:spcPct val="0"/>
+              </a:spcAft>
+              <a:defRPr>
+                <a:solidFill>
+                  <a:schemeClr val="tx1"/>
+                </a:solidFill>
+                <a:latin typeface="Arial" panose="020B0604020202020204" pitchFamily="34" charset="0"/>
+              </a:defRPr>
+            </a:lvl1pPr>
+            <a:lvl2pPr eaLnBrk="0" fontAlgn="base" hangingPunct="0">
+              <a:spcBef>
+                <a:spcPct val="0"/>
+              </a:spcBef>
+              <a:spcAft>
+                <a:spcPct val="0"/>
+              </a:spcAft>
+              <a:defRPr>
+                <a:solidFill>
+                  <a:schemeClr val="tx1"/>
+                </a:solidFill>
+                <a:latin typeface="Arial" panose="020B0604020202020204" pitchFamily="34" charset="0"/>
+              </a:defRPr>
+            </a:lvl2pPr>
+            <a:lvl3pPr eaLnBrk="0" fontAlgn="base" hangingPunct="0">
+              <a:spcBef>
+                <a:spcPct val="0"/>
+              </a:spcBef>
+              <a:spcAft>
+                <a:spcPct val="0"/>
+              </a:spcAft>
+              <a:defRPr>
+                <a:solidFill>
+                  <a:schemeClr val="tx1"/>
+                </a:solidFill>
+                <a:latin typeface="Arial" panose="020B0604020202020204" pitchFamily="34" charset="0"/>
+              </a:defRPr>
+            </a:lvl3pPr>
+            <a:lvl4pPr eaLnBrk="0" fontAlgn="base" hangingPunct="0">
+              <a:spcBef>
+                <a:spcPct val="0"/>
+              </a:spcBef>
+              <a:spcAft>
+                <a:spcPct val="0"/>
+              </a:spcAft>
+              <a:defRPr>
+                <a:solidFill>
+                  <a:schemeClr val="tx1"/>
+                </a:solidFill>
+                <a:latin typeface="Arial" panose="020B0604020202020204" pitchFamily="34" charset="0"/>
+              </a:defRPr>
+            </a:lvl4pPr>
+            <a:lvl5pPr eaLnBrk="0" fontAlgn="base" hangingPunct="0">
+              <a:spcBef>
+                <a:spcPct val="0"/>
+              </a:spcBef>
+              <a:spcAft>
+                <a:spcPct val="0"/>
+              </a:spcAft>
+              <a:defRPr>
+                <a:solidFill>
+                  <a:schemeClr val="tx1"/>
+                </a:solidFill>
+                <a:latin typeface="Arial" panose="020B0604020202020204" pitchFamily="34" charset="0"/>
+              </a:defRPr>
+            </a:lvl5pPr>
+            <a:lvl6pPr eaLnBrk="0" fontAlgn="base" hangingPunct="0">
+              <a:spcBef>
+                <a:spcPct val="0"/>
+              </a:spcBef>
+              <a:spcAft>
+                <a:spcPct val="0"/>
+              </a:spcAft>
+              <a:defRPr>
+                <a:solidFill>
+                  <a:schemeClr val="tx1"/>
+                </a:solidFill>
+                <a:latin typeface="Arial" panose="020B0604020202020204" pitchFamily="34" charset="0"/>
+              </a:defRPr>
+            </a:lvl6pPr>
+            <a:lvl7pPr eaLnBrk="0" fontAlgn="base" hangingPunct="0">
+              <a:spcBef>
+                <a:spcPct val="0"/>
+              </a:spcBef>
+              <a:spcAft>
+                <a:spcPct val="0"/>
+              </a:spcAft>
+              <a:defRPr>
+                <a:solidFill>
+                  <a:schemeClr val="tx1"/>
+                </a:solidFill>
+                <a:latin typeface="Arial" panose="020B0604020202020204" pitchFamily="34" charset="0"/>
+              </a:defRPr>
+            </a:lvl7pPr>
+            <a:lvl8pPr eaLnBrk="0" fontAlgn="base" hangingPunct="0">
+              <a:spcBef>
+                <a:spcPct val="0"/>
+              </a:spcBef>
+              <a:spcAft>
+                <a:spcPct val="0"/>
+              </a:spcAft>
+              <a:defRPr>
+                <a:solidFill>
+                  <a:schemeClr val="tx1"/>
+                </a:solidFill>
+                <a:latin typeface="Arial" panose="020B0604020202020204" pitchFamily="34" charset="0"/>
+              </a:defRPr>
+            </a:lvl8pPr>
+            <a:lvl9pPr eaLnBrk="0" fontAlgn="base" hangingPunct="0">
+              <a:spcBef>
+                <a:spcPct val="0"/>
+              </a:spcBef>
+              <a:spcAft>
+                <a:spcPct val="0"/>
+              </a:spcAft>
+              <a:defRPr>
+                <a:solidFill>
+                  <a:schemeClr val="tx1"/>
+                </a:solidFill>
+                <a:latin typeface="Arial" panose="020B0604020202020204" pitchFamily="34" charset="0"/>
+              </a:defRPr>
+            </a:lvl9pPr>
+          </a:lstStyle>
+          <a:p>
+            <a:pPr marL="0" marR="0" lvl="0" indent="0" algn="l" defTabSz="914400" rtl="0" eaLnBrk="0" fontAlgn="base" latinLnBrk="0" hangingPunct="0">
+              <a:lnSpc>
+                <a:spcPct val="100000"/>
+              </a:lnSpc>
+              <a:spcBef>
+                <a:spcPct val="0"/>
+              </a:spcBef>
+              <a:spcAft>
+                <a:spcPct val="0"/>
+              </a:spcAft>
+              <a:buClrTx/>
+              <a:buSzTx/>
+              <a:buFontTx/>
+              <a:buNone/>
+              <a:tabLst/>
+            </a:pPr>
+            <a:r>
+              <a:rPr kumimoji="0" lang="ru-RU" altLang="ru-RU" sz="1400" b="0" i="0" u="none" strike="noStrike" cap="none" normalizeH="0" baseline="0" dirty="0">
+                <a:ln>
+                  <a:noFill/>
+                </a:ln>
+                <a:solidFill>
+                  <a:srgbClr val="222222"/>
+                </a:solidFill>
+                <a:effectLst/>
+                <a:latin typeface="Times New Roman" panose="02020603050405020304" pitchFamily="18" charset="0"/>
+                <a:cs typeface="Times New Roman" panose="02020603050405020304" pitchFamily="18" charset="0"/>
+              </a:rPr>
+              <a:t>В течение работы алгоритма создается не более O(n) вершин. Все суффиксы, которые заканчиваются в листах, благодаря </a:t>
+            </a:r>
+            <a:r>
+              <a:rPr kumimoji="0" lang="ru-RU" altLang="ru-RU" sz="1400" b="0" i="0" u="none" strike="noStrike" cap="none" normalizeH="0" dirty="0">
+                <a:ln>
+                  <a:noFill/>
+                </a:ln>
+                <a:solidFill>
+                  <a:srgbClr val="222222"/>
+                </a:solidFill>
+                <a:effectLst/>
+                <a:latin typeface="Times New Roman" panose="02020603050405020304" pitchFamily="18" charset="0"/>
+                <a:cs typeface="Times New Roman" panose="02020603050405020304" pitchFamily="18" charset="0"/>
+              </a:rPr>
+              <a:t> первому правилу </a:t>
+            </a:r>
+            <a:r>
+              <a:rPr kumimoji="0" lang="ru-RU" altLang="ru-RU" sz="1400" b="0" i="0" u="none" strike="noStrike" cap="none" normalizeH="0" baseline="0" dirty="0">
+                <a:ln>
+                  <a:noFill/>
+                </a:ln>
+                <a:solidFill>
+                  <a:srgbClr val="222222"/>
+                </a:solidFill>
+                <a:effectLst/>
+                <a:latin typeface="Times New Roman" panose="02020603050405020304" pitchFamily="18" charset="0"/>
+                <a:cs typeface="Times New Roman" panose="02020603050405020304" pitchFamily="18" charset="0"/>
+              </a:rPr>
+              <a:t>на каждой итерации мы увеличиваем на текущий символ по умолчанию за O(1).</a:t>
+            </a:r>
+          </a:p>
+          <a:p>
+            <a:pPr marL="0" marR="0" lvl="0" indent="0" algn="l" defTabSz="914400" rtl="0" eaLnBrk="0" fontAlgn="base" latinLnBrk="0" hangingPunct="0">
+              <a:lnSpc>
+                <a:spcPct val="100000"/>
+              </a:lnSpc>
+              <a:spcBef>
+                <a:spcPct val="0"/>
+              </a:spcBef>
+              <a:spcAft>
+                <a:spcPct val="0"/>
+              </a:spcAft>
+              <a:buClrTx/>
+              <a:buSzTx/>
+              <a:buFontTx/>
+              <a:buNone/>
+              <a:tabLst/>
+            </a:pPr>
+            <a:endParaRPr kumimoji="0" lang="ru-RU" altLang="ru-RU" sz="1400" b="0" i="0" u="none" strike="noStrike" cap="none" normalizeH="0" baseline="0" dirty="0">
+              <a:ln>
+                <a:noFill/>
+              </a:ln>
+              <a:solidFill>
+                <a:srgbClr val="222222"/>
+              </a:solidFill>
+              <a:effectLst/>
+              <a:latin typeface="Times New Roman" panose="02020603050405020304" pitchFamily="18" charset="0"/>
+              <a:cs typeface="Times New Roman" panose="02020603050405020304" pitchFamily="18" charset="0"/>
+            </a:endParaRPr>
+          </a:p>
+          <a:p>
+            <a:pPr marL="0" marR="0" lvl="0" indent="0" algn="l" defTabSz="914400" rtl="0" eaLnBrk="0" fontAlgn="base" latinLnBrk="0" hangingPunct="0">
+              <a:lnSpc>
+                <a:spcPct val="100000"/>
+              </a:lnSpc>
+              <a:spcBef>
+                <a:spcPct val="0"/>
+              </a:spcBef>
+              <a:spcAft>
+                <a:spcPct val="0"/>
+              </a:spcAft>
+              <a:buClrTx/>
+              <a:buSzTx/>
+              <a:buFontTx/>
+              <a:buNone/>
+              <a:tabLst/>
+            </a:pPr>
+            <a:r>
+              <a:rPr kumimoji="0" lang="ru-RU" altLang="ru-RU" sz="1400" b="0" i="0" u="none" strike="noStrike" cap="none" normalizeH="0" baseline="0" dirty="0">
+                <a:ln>
+                  <a:noFill/>
+                </a:ln>
+                <a:solidFill>
+                  <a:srgbClr val="222222"/>
+                </a:solidFill>
+                <a:effectLst/>
+                <a:latin typeface="Times New Roman" panose="02020603050405020304" pitchFamily="18" charset="0"/>
+                <a:cs typeface="Times New Roman" panose="02020603050405020304" pitchFamily="18" charset="0"/>
+              </a:rPr>
+              <a:t> Текущая фаза алгоритма будет продолжаться, пока не будет использовано правило продления 3. Сначала неявно продлятся все листовые суффиксы, а потом по правилу</a:t>
+            </a:r>
+            <a:r>
+              <a:rPr kumimoji="0" lang="ru-RU" altLang="ru-RU" sz="1400" b="0" i="0" u="none" strike="noStrike" cap="none" normalizeH="0" dirty="0">
+                <a:ln>
+                  <a:noFill/>
+                </a:ln>
+                <a:solidFill>
+                  <a:srgbClr val="222222"/>
+                </a:solidFill>
+                <a:effectLst/>
+                <a:latin typeface="Times New Roman" panose="02020603050405020304" pitchFamily="18" charset="0"/>
+                <a:cs typeface="Times New Roman" panose="02020603050405020304" pitchFamily="18" charset="0"/>
+              </a:rPr>
+              <a:t> 2 </a:t>
+            </a:r>
+            <a:r>
+              <a:rPr kumimoji="0" lang="ru-RU" altLang="ru-RU" sz="1400" b="0" i="0" u="none" strike="noStrike" cap="none" normalizeH="0" baseline="0" dirty="0">
+                <a:ln>
+                  <a:noFill/>
+                </a:ln>
+                <a:solidFill>
+                  <a:srgbClr val="222222"/>
+                </a:solidFill>
+                <a:effectLst/>
+                <a:latin typeface="Times New Roman" panose="02020603050405020304" pitchFamily="18" charset="0"/>
+                <a:cs typeface="Times New Roman" panose="02020603050405020304" pitchFamily="18" charset="0"/>
+              </a:rPr>
+              <a:t>будет создано несколько новых внутренних вершин. Так как вершин не может быть создано больше, чем их есть, то </a:t>
+            </a:r>
+            <a:r>
+              <a:rPr kumimoji="0" lang="ru-RU" altLang="ru-RU" sz="1400" b="0" i="0" u="none" strike="noStrike" cap="none" normalizeH="0" baseline="0" dirty="0" err="1">
+                <a:ln>
+                  <a:noFill/>
+                </a:ln>
+                <a:solidFill>
+                  <a:srgbClr val="222222"/>
+                </a:solidFill>
+                <a:effectLst/>
+                <a:latin typeface="Times New Roman" panose="02020603050405020304" pitchFamily="18" charset="0"/>
+                <a:cs typeface="Times New Roman" panose="02020603050405020304" pitchFamily="18" charset="0"/>
+              </a:rPr>
+              <a:t>амортизационно</a:t>
+            </a:r>
+            <a:r>
+              <a:rPr kumimoji="0" lang="ru-RU" altLang="ru-RU" sz="1400" b="0" i="0" u="none" strike="noStrike" cap="none" normalizeH="0" baseline="0" dirty="0">
+                <a:ln>
+                  <a:noFill/>
+                </a:ln>
+                <a:solidFill>
+                  <a:srgbClr val="222222"/>
+                </a:solidFill>
+                <a:effectLst/>
+                <a:latin typeface="Times New Roman" panose="02020603050405020304" pitchFamily="18" charset="0"/>
+                <a:cs typeface="Times New Roman" panose="02020603050405020304" pitchFamily="18" charset="0"/>
+              </a:rPr>
+              <a:t> на каждой фазе будет создано O(1) вершин.</a:t>
+            </a:r>
+          </a:p>
+          <a:p>
+            <a:pPr marL="0" marR="0" lvl="0" indent="0" algn="l" defTabSz="914400" rtl="0" eaLnBrk="0" fontAlgn="base" latinLnBrk="0" hangingPunct="0">
+              <a:lnSpc>
+                <a:spcPct val="100000"/>
+              </a:lnSpc>
+              <a:spcBef>
+                <a:spcPct val="0"/>
+              </a:spcBef>
+              <a:spcAft>
+                <a:spcPct val="0"/>
+              </a:spcAft>
+              <a:buClrTx/>
+              <a:buSzTx/>
+              <a:buFontTx/>
+              <a:buNone/>
+              <a:tabLst/>
+            </a:pPr>
+            <a:endParaRPr kumimoji="0" lang="ru-RU" altLang="ru-RU" sz="1400" b="0" i="0" u="none" strike="noStrike" cap="none" normalizeH="0" baseline="0" dirty="0">
+              <a:ln>
+                <a:noFill/>
+              </a:ln>
+              <a:solidFill>
+                <a:srgbClr val="222222"/>
+              </a:solidFill>
+              <a:effectLst/>
+              <a:latin typeface="Times New Roman" panose="02020603050405020304" pitchFamily="18" charset="0"/>
+              <a:cs typeface="Times New Roman" panose="02020603050405020304" pitchFamily="18" charset="0"/>
+            </a:endParaRPr>
+          </a:p>
+          <a:p>
+            <a:pPr marL="0" marR="0" lvl="0" indent="0" algn="l" defTabSz="914400" rtl="0" eaLnBrk="0" fontAlgn="base" latinLnBrk="0" hangingPunct="0">
+              <a:lnSpc>
+                <a:spcPct val="100000"/>
+              </a:lnSpc>
+              <a:spcBef>
+                <a:spcPct val="0"/>
+              </a:spcBef>
+              <a:spcAft>
+                <a:spcPct val="0"/>
+              </a:spcAft>
+              <a:buClrTx/>
+              <a:buSzTx/>
+              <a:buFontTx/>
+              <a:buNone/>
+              <a:tabLst/>
+            </a:pPr>
+            <a:r>
+              <a:rPr kumimoji="0" lang="ru-RU" altLang="ru-RU" sz="1400" b="0" i="0" u="none" strike="noStrike" cap="none" normalizeH="0" baseline="0" dirty="0">
+                <a:ln>
+                  <a:noFill/>
+                </a:ln>
+                <a:solidFill>
+                  <a:srgbClr val="222222"/>
+                </a:solidFill>
+                <a:effectLst/>
+                <a:latin typeface="Times New Roman" panose="02020603050405020304" pitchFamily="18" charset="0"/>
+                <a:cs typeface="Times New Roman" panose="02020603050405020304" pitchFamily="18" charset="0"/>
+              </a:rPr>
+              <a:t> Так как мы на каждой фазе начинаем добавление суффикса не с корня, а с индекса j∗, на котором в прошлой фазе было применено правило 3, то</a:t>
+            </a:r>
+            <a:r>
+              <a:rPr kumimoji="0" lang="ru-RU" altLang="ru-RU" sz="1400" b="0" i="0" u="none" strike="noStrike" cap="none" normalizeH="0" dirty="0">
+                <a:ln>
+                  <a:noFill/>
+                </a:ln>
+                <a:solidFill>
+                  <a:srgbClr val="222222"/>
+                </a:solidFill>
+                <a:effectLst/>
+                <a:latin typeface="Times New Roman" panose="02020603050405020304" pitchFamily="18" charset="0"/>
+                <a:cs typeface="Times New Roman" panose="02020603050405020304" pitchFamily="18" charset="0"/>
+              </a:rPr>
+              <a:t> есть </a:t>
+            </a:r>
+            <a:r>
+              <a:rPr kumimoji="0" lang="ru-RU" altLang="ru-RU" sz="1400" b="0" i="0" u="none" strike="noStrike" cap="none" normalizeH="0" baseline="0" dirty="0">
+                <a:ln>
+                  <a:noFill/>
+                </a:ln>
+                <a:solidFill>
+                  <a:srgbClr val="222222"/>
+                </a:solidFill>
+                <a:effectLst/>
+                <a:latin typeface="Times New Roman" panose="02020603050405020304" pitchFamily="18" charset="0"/>
+                <a:cs typeface="Times New Roman" panose="02020603050405020304" pitchFamily="18" charset="0"/>
+              </a:rPr>
+              <a:t>суммарное число переходов по рёбрам за все n фаз равно O(n).</a:t>
+            </a:r>
+          </a:p>
+          <a:p>
+            <a:pPr marL="0" marR="0" lvl="0" indent="0" algn="l" defTabSz="914400" rtl="0" eaLnBrk="0" fontAlgn="base" latinLnBrk="0" hangingPunct="0">
+              <a:lnSpc>
+                <a:spcPct val="100000"/>
+              </a:lnSpc>
+              <a:spcBef>
+                <a:spcPct val="0"/>
+              </a:spcBef>
+              <a:spcAft>
+                <a:spcPct val="0"/>
+              </a:spcAft>
+              <a:buClrTx/>
+              <a:buSzTx/>
+              <a:buFontTx/>
+              <a:buNone/>
+              <a:tabLst/>
+            </a:pPr>
+            <a:endParaRPr kumimoji="0" lang="ru-RU" altLang="ru-RU" sz="1400" b="0" i="0" u="none" strike="noStrike" cap="none" normalizeH="0" baseline="0" dirty="0">
+              <a:ln>
+                <a:noFill/>
+              </a:ln>
+              <a:solidFill>
+                <a:schemeClr val="tx1"/>
+              </a:solidFill>
+              <a:effectLst/>
+              <a:latin typeface="Times New Roman" panose="02020603050405020304" pitchFamily="18" charset="0"/>
+              <a:cs typeface="Times New Roman" panose="02020603050405020304" pitchFamily="18" charset="0"/>
+            </a:endParaRPr>
+          </a:p>
+          <a:p>
+            <a:pPr marL="0" marR="0" lvl="0" indent="0" algn="l" defTabSz="914400" rtl="0" eaLnBrk="0" fontAlgn="base" latinLnBrk="0" hangingPunct="0">
+              <a:lnSpc>
+                <a:spcPct val="100000"/>
+              </a:lnSpc>
+              <a:spcBef>
+                <a:spcPct val="0"/>
+              </a:spcBef>
+              <a:spcAft>
+                <a:spcPct val="0"/>
+              </a:spcAft>
+              <a:buClrTx/>
+              <a:buSzTx/>
+              <a:buFontTx/>
+              <a:buNone/>
+              <a:tabLst/>
+            </a:pPr>
+            <a:r>
+              <a:rPr kumimoji="0" lang="ru-RU" altLang="ru-RU" sz="1400" b="0" i="0" u="none" strike="noStrike" cap="none" normalizeH="0" baseline="0" dirty="0">
+                <a:ln>
+                  <a:noFill/>
+                </a:ln>
+                <a:solidFill>
+                  <a:srgbClr val="222222"/>
+                </a:solidFill>
+                <a:effectLst/>
+                <a:latin typeface="Times New Roman" panose="02020603050405020304" pitchFamily="18" charset="0"/>
+                <a:cs typeface="Times New Roman" panose="02020603050405020304" pitchFamily="18" charset="0"/>
+              </a:rPr>
+              <a:t>Таким образом, при использовании всех приведённых эвристик алгоритм Укконена работает за O(n).</a:t>
+            </a:r>
+            <a:endParaRPr kumimoji="0" lang="ru-RU" altLang="ru-RU" sz="1400" b="0" i="0" u="none" strike="noStrike" cap="none" normalizeH="0" baseline="0" dirty="0">
+              <a:ln>
+                <a:noFill/>
+              </a:ln>
+              <a:solidFill>
+                <a:schemeClr val="tx1"/>
+              </a:solidFill>
+              <a:effectLst/>
+              <a:latin typeface="Times New Roman" panose="02020603050405020304" pitchFamily="18" charset="0"/>
+              <a:cs typeface="Times New Roman" panose="02020603050405020304" pitchFamily="18" charset="0"/>
+            </a:endParaRPr>
+          </a:p>
+        </p:txBody>
+      </p:sp>
+      <p:grpSp>
+        <p:nvGrpSpPr>
+          <p:cNvPr id="7" name="Группа 6">
+            <a:extLst>
+              <a:ext uri="{FF2B5EF4-FFF2-40B4-BE49-F238E27FC236}">
+                <a16:creationId xmlns:a16="http://schemas.microsoft.com/office/drawing/2014/main" id="{42838482-28B5-343C-5968-6DB7421F4EE3}"/>
+              </a:ext>
+            </a:extLst>
+          </p:cNvPr>
+          <p:cNvGrpSpPr/>
+          <p:nvPr/>
+        </p:nvGrpSpPr>
+        <p:grpSpPr>
+          <a:xfrm>
+            <a:off x="6879742" y="1690688"/>
+            <a:ext cx="4760198" cy="3124963"/>
+            <a:chOff x="7366699" y="1246846"/>
+            <a:chExt cx="4760198" cy="3124963"/>
+          </a:xfrm>
+        </p:grpSpPr>
+        <p:pic>
+          <p:nvPicPr>
+            <p:cNvPr id="4" name="Рисунок 3">
+              <a:extLst>
+                <a:ext uri="{FF2B5EF4-FFF2-40B4-BE49-F238E27FC236}">
+                  <a16:creationId xmlns:a16="http://schemas.microsoft.com/office/drawing/2014/main" id="{C976C4CE-6029-A2FD-D98F-7960F4CDC60B}"/>
+                </a:ext>
+              </a:extLst>
+            </p:cNvPr>
+            <p:cNvPicPr>
+              <a:picLocks noChangeAspect="1"/>
+            </p:cNvPicPr>
+            <p:nvPr/>
+          </p:nvPicPr>
+          <p:blipFill>
+            <a:blip r:embed="rId3"/>
+            <a:stretch>
+              <a:fillRect/>
+            </a:stretch>
+          </p:blipFill>
+          <p:spPr>
+            <a:xfrm>
+              <a:off x="7366699" y="1616178"/>
+              <a:ext cx="4578493" cy="2755631"/>
+            </a:xfrm>
+            <a:prstGeom prst="rect">
+              <a:avLst/>
+            </a:prstGeom>
+          </p:spPr>
+        </p:pic>
+        <p:sp>
+          <p:nvSpPr>
+            <p:cNvPr id="6" name="TextBox 5">
+              <a:extLst>
+                <a:ext uri="{FF2B5EF4-FFF2-40B4-BE49-F238E27FC236}">
+                  <a16:creationId xmlns:a16="http://schemas.microsoft.com/office/drawing/2014/main" id="{B789E15B-C4C6-517A-03E6-F12A53D7A985}"/>
+                </a:ext>
+              </a:extLst>
+            </p:cNvPr>
+            <p:cNvSpPr txBox="1"/>
+            <p:nvPr/>
+          </p:nvSpPr>
+          <p:spPr>
+            <a:xfrm>
+              <a:off x="7548404" y="1246846"/>
+              <a:ext cx="4578493" cy="369332"/>
+            </a:xfrm>
+            <a:prstGeom prst="rect">
+              <a:avLst/>
+            </a:prstGeom>
+            <a:noFill/>
+          </p:spPr>
+          <p:txBody>
+            <a:bodyPr wrap="square" rtlCol="0">
+              <a:spAutoFit/>
+            </a:bodyPr>
+            <a:lstStyle/>
+            <a:p>
+              <a:r>
+                <a:rPr lang="ru-RU" dirty="0"/>
+                <a:t>Время работы алгоритма в микросекундах</a:t>
+              </a:r>
+            </a:p>
+          </p:txBody>
+        </p:sp>
+      </p:grpSp>
+    </p:spTree>
+    <p:extLst>
+      <p:ext uri="{BB962C8B-B14F-4D97-AF65-F5344CB8AC3E}">
+        <p14:creationId xmlns:p14="http://schemas.microsoft.com/office/powerpoint/2010/main" val="3855171655"/>
+      </p:ext>
+    </p:extLst>
+  </p:cSld>
+  <p:clrMapOvr>
+    <a:masterClrMapping/>
+  </p:clrMapOvr>
+</p:sld>
+</file>
+
+<file path=ppt/slides/slide15.xml><?xml version="1.0" encoding="utf-8"?>
 <p:sld xmlns:a="http://schemas.openxmlformats.org/drawingml/2006/main" xmlns:r="http://schemas.openxmlformats.org/officeDocument/2006/relationships" xmlns:p="http://schemas.openxmlformats.org/presentationml/2006/main">
   <p:cSld>
     <p:spTree>
@@ -8116,7 +8911,7 @@
 </p:sld>
 </file>
 
-<file path=ppt/slides/slide15.xml><?xml version="1.0" encoding="utf-8"?>
+<file path=ppt/slides/slide16.xml><?xml version="1.0" encoding="utf-8"?>
 <p:sld xmlns:a="http://schemas.openxmlformats.org/drawingml/2006/main" xmlns:r="http://schemas.openxmlformats.org/officeDocument/2006/relationships" xmlns:p="http://schemas.openxmlformats.org/presentationml/2006/main">
   <p:cSld>
     <p:spTree>
@@ -8218,7 +9013,7 @@
 </p:sld>
 </file>
 
-<file path=ppt/slides/slide16.xml><?xml version="1.0" encoding="utf-8"?>
+<file path=ppt/slides/slide17.xml><?xml version="1.0" encoding="utf-8"?>
 <p:sld xmlns:a="http://schemas.openxmlformats.org/drawingml/2006/main" xmlns:r="http://schemas.openxmlformats.org/officeDocument/2006/relationships" xmlns:p="http://schemas.openxmlformats.org/presentationml/2006/main">
   <p:cSld>
     <p:spTree>
@@ -8320,7 +9115,7 @@
 </p:sld>
 </file>
 
-<file path=ppt/slides/slide17.xml><?xml version="1.0" encoding="utf-8"?>
+<file path=ppt/slides/slide18.xml><?xml version="1.0" encoding="utf-8"?>
 <p:sld xmlns:a="http://schemas.openxmlformats.org/drawingml/2006/main" xmlns:r="http://schemas.openxmlformats.org/officeDocument/2006/relationships" xmlns:p="http://schemas.openxmlformats.org/presentationml/2006/main">
   <p:cSld>
     <p:spTree>
@@ -8422,7 +9217,7 @@
 </p:sld>
 </file>
 
-<file path=ppt/slides/slide18.xml><?xml version="1.0" encoding="utf-8"?>
+<file path=ppt/slides/slide19.xml><?xml version="1.0" encoding="utf-8"?>
 <p:sld xmlns:a="http://schemas.openxmlformats.org/drawingml/2006/main" xmlns:r="http://schemas.openxmlformats.org/officeDocument/2006/relationships" xmlns:p="http://schemas.openxmlformats.org/presentationml/2006/main">
   <p:cSld>
     <p:spTree>
@@ -8524,7 +9319,346 @@
 </p:sld>
 </file>
 
-<file path=ppt/slides/slide19.xml><?xml version="1.0" encoding="utf-8"?>
+<file path=ppt/slides/slide2.xml><?xml version="1.0" encoding="utf-8"?>
+<p:sld xmlns:a="http://schemas.openxmlformats.org/drawingml/2006/main" xmlns:r="http://schemas.openxmlformats.org/officeDocument/2006/relationships" xmlns:p="http://schemas.openxmlformats.org/presentationml/2006/main">
+  <p:cSld>
+    <p:spTree>
+      <p:nvGrpSpPr>
+        <p:cNvPr id="1" name=""/>
+        <p:cNvGrpSpPr/>
+        <p:nvPr/>
+      </p:nvGrpSpPr>
+      <p:grpSpPr>
+        <a:xfrm>
+          <a:off x="0" y="0"/>
+          <a:ext cx="0" cy="0"/>
+          <a:chOff x="0" y="0"/>
+          <a:chExt cx="0" cy="0"/>
+        </a:xfrm>
+      </p:grpSpPr>
+      <p:sp>
+        <p:nvSpPr>
+          <p:cNvPr id="2" name="Заголовок 1">
+            <a:extLst>
+              <a:ext uri="{FF2B5EF4-FFF2-40B4-BE49-F238E27FC236}">
+                <a16:creationId xmlns:a16="http://schemas.microsoft.com/office/drawing/2014/main" id="{5C3D208E-29B6-0633-FDD9-7CB75B416567}"/>
+              </a:ext>
+            </a:extLst>
+          </p:cNvPr>
+          <p:cNvSpPr>
+            <a:spLocks noGrp="1"/>
+          </p:cNvSpPr>
+          <p:nvPr>
+            <p:ph type="title"/>
+          </p:nvPr>
+        </p:nvSpPr>
+        <p:spPr/>
+        <p:txBody>
+          <a:bodyPr/>
+          <a:lstStyle/>
+          <a:p>
+            <a:r>
+              <a:rPr lang="ru-RU" dirty="0"/>
+              <a:t>История Алгоритма Укконена</a:t>
+            </a:r>
+          </a:p>
+        </p:txBody>
+      </p:sp>
+      <p:sp>
+        <p:nvSpPr>
+          <p:cNvPr id="3" name="Объект 2">
+            <a:extLst>
+              <a:ext uri="{FF2B5EF4-FFF2-40B4-BE49-F238E27FC236}">
+                <a16:creationId xmlns:a16="http://schemas.microsoft.com/office/drawing/2014/main" id="{0C00D144-24C2-2D46-F6A9-2B6F9098620D}"/>
+              </a:ext>
+            </a:extLst>
+          </p:cNvPr>
+          <p:cNvSpPr>
+            <a:spLocks noGrp="1"/>
+          </p:cNvSpPr>
+          <p:nvPr>
+            <p:ph idx="1"/>
+          </p:nvPr>
+        </p:nvSpPr>
+        <p:spPr>
+          <a:xfrm>
+            <a:off x="6365288" y="1890944"/>
+            <a:ext cx="4988511" cy="4286019"/>
+          </a:xfrm>
+        </p:spPr>
+        <p:txBody>
+          <a:bodyPr>
+            <a:normAutofit/>
+          </a:bodyPr>
+          <a:lstStyle/>
+          <a:p>
+            <a:pPr marL="0" indent="0">
+              <a:buNone/>
+            </a:pPr>
+            <a:r>
+              <a:rPr lang="ru-RU" sz="2000" b="1" i="0" dirty="0">
+                <a:solidFill>
+                  <a:srgbClr val="202122"/>
+                </a:solidFill>
+                <a:effectLst/>
+              </a:rPr>
+              <a:t>Эско Юхани </a:t>
+            </a:r>
+            <a:r>
+              <a:rPr lang="ru-RU" sz="2000" b="1" i="0" dirty="0" err="1">
+                <a:solidFill>
+                  <a:srgbClr val="202122"/>
+                </a:solidFill>
+                <a:effectLst/>
+              </a:rPr>
+              <a:t>Укконен</a:t>
+            </a:r>
+            <a:r>
+              <a:rPr lang="ru-RU" sz="2000" dirty="0"/>
+              <a:t> (р. 1950) - финский </a:t>
+            </a:r>
+            <a:r>
+              <a:rPr lang="ru-RU" sz="2000" b="0" i="0" u="none" strike="noStrike" dirty="0">
+                <a:solidFill>
+                  <a:srgbClr val="0645AD"/>
+                </a:solidFill>
+                <a:effectLst/>
+                <a:hlinkClick r:id="rId2" tooltip="Теоретическая информатика"/>
+              </a:rPr>
+              <a:t>ученый-теоретик информатики</a:t>
+            </a:r>
+            <a:r>
+              <a:rPr lang="ru-RU" sz="2000" dirty="0"/>
+              <a:t>, известный своим вкладом в </a:t>
+            </a:r>
+            <a:r>
+              <a:rPr lang="ru-RU" sz="2000" b="0" i="0" u="none" strike="noStrike" dirty="0">
+                <a:solidFill>
+                  <a:srgbClr val="0645AD"/>
+                </a:solidFill>
+                <a:effectLst/>
+                <a:hlinkClick r:id="rId3" tooltip="Строковые алгоритмы"/>
+              </a:rPr>
+              <a:t>строковые алгоритмы</a:t>
+            </a:r>
+            <a:r>
+              <a:rPr lang="ru-RU" sz="2000" dirty="0"/>
+              <a:t>, и в частности, алгоритмом </a:t>
+            </a:r>
+            <a:r>
+              <a:rPr lang="ru-RU" sz="2000" b="0" i="0" u="none" strike="noStrike" dirty="0">
+                <a:solidFill>
+                  <a:srgbClr val="0645AD"/>
+                </a:solidFill>
+                <a:effectLst/>
+                <a:hlinkClick r:id="rId4" tooltip="Алгоритм Укконена"/>
+              </a:rPr>
+              <a:t>Укконена</a:t>
+            </a:r>
+            <a:r>
+              <a:rPr lang="ru-RU" sz="2000" b="0" i="0" u="none" strike="noStrike" baseline="30000" dirty="0">
+                <a:solidFill>
+                  <a:srgbClr val="0645AD"/>
+                </a:solidFill>
+                <a:effectLst/>
+                <a:hlinkClick r:id="rId5"/>
+              </a:rPr>
+              <a:t>[1]</a:t>
+            </a:r>
+            <a:r>
+              <a:rPr lang="ru-RU" sz="2000" dirty="0"/>
+              <a:t> для построения </a:t>
+            </a:r>
+            <a:r>
+              <a:rPr lang="ru-RU" sz="2000" b="0" i="0" u="none" strike="noStrike" dirty="0">
+                <a:solidFill>
+                  <a:srgbClr val="0645AD"/>
+                </a:solidFill>
+                <a:effectLst/>
+                <a:hlinkClick r:id="rId6" tooltip="Дерево суффиксов"/>
+              </a:rPr>
+              <a:t>дерева суффиксов</a:t>
+            </a:r>
+            <a:r>
+              <a:rPr lang="ru-RU" sz="2000" b="0" i="0" u="none" strike="noStrike" dirty="0">
+                <a:solidFill>
+                  <a:srgbClr val="0645AD"/>
+                </a:solidFill>
+                <a:effectLst/>
+              </a:rPr>
+              <a:t> </a:t>
+            </a:r>
+            <a:r>
+              <a:rPr lang="ru-RU" sz="2000" b="0" i="0" u="none" strike="noStrike" dirty="0">
+                <a:effectLst/>
+              </a:rPr>
+              <a:t>предложенный им в 1995 году</a:t>
+            </a:r>
+            <a:r>
+              <a:rPr lang="ru-RU" sz="2000" dirty="0"/>
+              <a:t>. Он является почетным профессором </a:t>
+            </a:r>
+            <a:r>
+              <a:rPr lang="ru-RU" sz="2000" b="0" i="0" u="none" strike="noStrike" dirty="0">
+                <a:solidFill>
+                  <a:srgbClr val="0645AD"/>
+                </a:solidFill>
+                <a:effectLst/>
+                <a:hlinkClick r:id="rId7" tooltip="Хельсинкский университет"/>
+              </a:rPr>
+              <a:t>Хельсинкского университета</a:t>
+            </a:r>
+            <a:r>
+              <a:rPr lang="ru-RU" sz="2000" dirty="0"/>
+              <a:t>.</a:t>
+            </a:r>
+          </a:p>
+          <a:p>
+            <a:pPr marL="0" indent="0">
+              <a:buNone/>
+            </a:pPr>
+            <a:endParaRPr lang="ru-RU" sz="2000" dirty="0"/>
+          </a:p>
+          <a:p>
+            <a:pPr marL="0" indent="0">
+              <a:buNone/>
+            </a:pPr>
+            <a:endParaRPr lang="ru-RU" sz="2000" dirty="0"/>
+          </a:p>
+        </p:txBody>
+      </p:sp>
+      <p:sp>
+        <p:nvSpPr>
+          <p:cNvPr id="4" name="TextBox 3">
+            <a:extLst>
+              <a:ext uri="{FF2B5EF4-FFF2-40B4-BE49-F238E27FC236}">
+                <a16:creationId xmlns:a16="http://schemas.microsoft.com/office/drawing/2014/main" id="{7D76F9A8-2540-EEB1-715E-785F959B17C0}"/>
+              </a:ext>
+            </a:extLst>
+          </p:cNvPr>
+          <p:cNvSpPr txBox="1"/>
+          <p:nvPr/>
+        </p:nvSpPr>
+        <p:spPr>
+          <a:xfrm>
+            <a:off x="11833934" y="6506423"/>
+            <a:ext cx="237997" cy="369332"/>
+          </a:xfrm>
+          <a:prstGeom prst="rect">
+            <a:avLst/>
+          </a:prstGeom>
+          <a:noFill/>
+        </p:spPr>
+        <p:txBody>
+          <a:bodyPr wrap="square" rtlCol="0">
+            <a:spAutoFit/>
+          </a:bodyPr>
+          <a:lstStyle/>
+          <a:p>
+            <a:pPr algn="ctr"/>
+            <a:r>
+              <a:rPr lang="ru-RU" dirty="0"/>
+              <a:t>2</a:t>
+            </a:r>
+          </a:p>
+        </p:txBody>
+      </p:sp>
+      <p:pic>
+        <p:nvPicPr>
+          <p:cNvPr id="1028" name="Picture 4">
+            <a:extLst>
+              <a:ext uri="{FF2B5EF4-FFF2-40B4-BE49-F238E27FC236}">
+                <a16:creationId xmlns:a16="http://schemas.microsoft.com/office/drawing/2014/main" id="{A052091C-4FFB-E513-3328-D24DDFD2741A}"/>
+              </a:ext>
+            </a:extLst>
+          </p:cNvPr>
+          <p:cNvPicPr>
+            <a:picLocks noChangeAspect="1" noChangeArrowheads="1"/>
+          </p:cNvPicPr>
+          <p:nvPr/>
+        </p:nvPicPr>
+        <p:blipFill>
+          <a:blip r:embed="rId8">
+            <a:extLst>
+              <a:ext uri="{28A0092B-C50C-407E-A947-70E740481C1C}">
+                <a14:useLocalDpi xmlns:a14="http://schemas.microsoft.com/office/drawing/2010/main" val="0"/>
+              </a:ext>
+            </a:extLst>
+          </a:blip>
+          <a:srcRect/>
+          <a:stretch>
+            <a:fillRect/>
+          </a:stretch>
+        </p:blipFill>
+        <p:spPr bwMode="auto">
+          <a:xfrm>
+            <a:off x="1038688" y="1690688"/>
+            <a:ext cx="4432998" cy="3069982"/>
+          </a:xfrm>
+          <a:prstGeom prst="rect">
+            <a:avLst/>
+          </a:prstGeom>
+          <a:noFill/>
+          <a:extLst>
+            <a:ext uri="{909E8E84-426E-40DD-AFC4-6F175D3DCCD1}">
+              <a14:hiddenFill xmlns:a14="http://schemas.microsoft.com/office/drawing/2010/main">
+                <a:solidFill>
+                  <a:srgbClr val="FFFFFF"/>
+                </a:solidFill>
+              </a14:hiddenFill>
+            </a:ext>
+          </a:extLst>
+        </p:spPr>
+      </p:pic>
+      <p:sp>
+        <p:nvSpPr>
+          <p:cNvPr id="5" name="TextBox 4">
+            <a:extLst>
+              <a:ext uri="{FF2B5EF4-FFF2-40B4-BE49-F238E27FC236}">
+                <a16:creationId xmlns:a16="http://schemas.microsoft.com/office/drawing/2014/main" id="{958B18CB-12AC-D896-3527-4EFF0E9E3C55}"/>
+              </a:ext>
+            </a:extLst>
+          </p:cNvPr>
+          <p:cNvSpPr txBox="1"/>
+          <p:nvPr/>
+        </p:nvSpPr>
+        <p:spPr>
+          <a:xfrm>
+            <a:off x="6096000" y="3701988"/>
+            <a:ext cx="1378998" cy="369332"/>
+          </a:xfrm>
+          <a:prstGeom prst="rect">
+            <a:avLst/>
+          </a:prstGeom>
+          <a:noFill/>
+        </p:spPr>
+        <p:txBody>
+          <a:bodyPr wrap="square" rtlCol="0">
+            <a:spAutoFit/>
+          </a:bodyPr>
+          <a:lstStyle/>
+          <a:p>
+            <a:r>
+              <a:rPr lang="ru-RU" dirty="0"/>
+              <a:t>	</a:t>
+            </a:r>
+          </a:p>
+        </p:txBody>
+      </p:sp>
+    </p:spTree>
+    <p:extLst>
+      <p:ext uri="{BB962C8B-B14F-4D97-AF65-F5344CB8AC3E}">
+        <p14:creationId xmlns:p14="http://schemas.microsoft.com/office/powerpoint/2010/main" val="4134274443"/>
+      </p:ext>
+    </p:extLst>
+  </p:cSld>
+  <p:clrMapOvr>
+    <a:masterClrMapping/>
+  </p:clrMapOvr>
+</p:sld>
+</file>
+
+<file path=ppt/slides/slide20.xml><?xml version="1.0" encoding="utf-8"?>
 <p:sld xmlns:a="http://schemas.openxmlformats.org/drawingml/2006/main" xmlns:r="http://schemas.openxmlformats.org/officeDocument/2006/relationships" xmlns:p="http://schemas.openxmlformats.org/presentationml/2006/main">
   <p:cSld>
     <p:spTree>
@@ -8626,147 +9760,7 @@
 </p:sld>
 </file>
 
-<file path=ppt/slides/slide2.xml><?xml version="1.0" encoding="utf-8"?>
-<p:sld xmlns:a="http://schemas.openxmlformats.org/drawingml/2006/main" xmlns:r="http://schemas.openxmlformats.org/officeDocument/2006/relationships" xmlns:p="http://schemas.openxmlformats.org/presentationml/2006/main">
-  <p:cSld>
-    <p:spTree>
-      <p:nvGrpSpPr>
-        <p:cNvPr id="1" name=""/>
-        <p:cNvGrpSpPr/>
-        <p:nvPr/>
-      </p:nvGrpSpPr>
-      <p:grpSpPr>
-        <a:xfrm>
-          <a:off x="0" y="0"/>
-          <a:ext cx="0" cy="0"/>
-          <a:chOff x="0" y="0"/>
-          <a:chExt cx="0" cy="0"/>
-        </a:xfrm>
-      </p:grpSpPr>
-      <p:sp>
-        <p:nvSpPr>
-          <p:cNvPr id="2" name="Заголовок 1">
-            <a:extLst>
-              <a:ext uri="{FF2B5EF4-FFF2-40B4-BE49-F238E27FC236}">
-                <a16:creationId xmlns:a16="http://schemas.microsoft.com/office/drawing/2014/main" id="{C9DD5936-6EAC-559D-8450-8CFC714C675A}"/>
-              </a:ext>
-            </a:extLst>
-          </p:cNvPr>
-          <p:cNvSpPr>
-            <a:spLocks noGrp="1"/>
-          </p:cNvSpPr>
-          <p:nvPr>
-            <p:ph type="title"/>
-          </p:nvPr>
-        </p:nvSpPr>
-        <p:spPr/>
-        <p:txBody>
-          <a:bodyPr/>
-          <a:lstStyle/>
-          <a:p>
-            <a:r>
-              <a:rPr lang="ru-RU" dirty="0"/>
-              <a:t>Формальная постановка задачи</a:t>
-            </a:r>
-            <a:r>
-              <a:rPr lang="en-US" dirty="0"/>
-              <a:t>:</a:t>
-            </a:r>
-            <a:br>
-              <a:rPr lang="ru-RU" dirty="0"/>
-            </a:br>
-            <a:r>
-              <a:rPr lang="en-US" dirty="0"/>
-              <a:t>Online </a:t>
-            </a:r>
-            <a:r>
-              <a:rPr lang="ru-RU" dirty="0"/>
-              <a:t>поиск подстрок в строке</a:t>
-            </a:r>
-          </a:p>
-        </p:txBody>
-      </p:sp>
-      <p:graphicFrame>
-        <p:nvGraphicFramePr>
-          <p:cNvPr id="5" name="Объект 2">
-            <a:extLst>
-              <a:ext uri="{FF2B5EF4-FFF2-40B4-BE49-F238E27FC236}">
-                <a16:creationId xmlns:a16="http://schemas.microsoft.com/office/drawing/2014/main" id="{F3E6998B-3003-2E24-E209-50A77B9023A6}"/>
-              </a:ext>
-            </a:extLst>
-          </p:cNvPr>
-          <p:cNvGraphicFramePr>
-            <a:graphicFrameLocks noGrp="1"/>
-          </p:cNvGraphicFramePr>
-          <p:nvPr>
-            <p:ph idx="1"/>
-            <p:extLst>
-              <p:ext uri="{D42A27DB-BD31-4B8C-83A1-F6EECF244321}">
-                <p14:modId xmlns:p14="http://schemas.microsoft.com/office/powerpoint/2010/main" val="3786040545"/>
-              </p:ext>
-            </p:extLst>
-          </p:nvPr>
-        </p:nvGraphicFramePr>
-        <p:xfrm>
-          <a:off x="838200" y="1825625"/>
-          <a:ext cx="10515600" cy="4351338"/>
-        </p:xfrm>
-        <a:graphic>
-          <a:graphicData uri="http://schemas.openxmlformats.org/drawingml/2006/diagram">
-            <dgm:relIds xmlns:dgm="http://schemas.openxmlformats.org/drawingml/2006/diagram" xmlns:r="http://schemas.openxmlformats.org/officeDocument/2006/relationships" r:dm="rId2" r:lo="rId3" r:qs="rId4" r:cs="rId5"/>
-          </a:graphicData>
-        </a:graphic>
-      </p:graphicFrame>
-      <p:sp>
-        <p:nvSpPr>
-          <p:cNvPr id="4" name="TextBox 3">
-            <a:extLst>
-              <a:ext uri="{FF2B5EF4-FFF2-40B4-BE49-F238E27FC236}">
-                <a16:creationId xmlns:a16="http://schemas.microsoft.com/office/drawing/2014/main" id="{A5182898-B787-FE7E-5544-BC35C9D37D45}"/>
-              </a:ext>
-            </a:extLst>
-          </p:cNvPr>
-          <p:cNvSpPr txBox="1"/>
-          <p:nvPr/>
-        </p:nvSpPr>
-        <p:spPr>
-          <a:xfrm>
-            <a:off x="11833934" y="6506423"/>
-            <a:ext cx="237997" cy="369332"/>
-          </a:xfrm>
-          <a:prstGeom prst="rect">
-            <a:avLst/>
-          </a:prstGeom>
-          <a:noFill/>
-        </p:spPr>
-        <p:txBody>
-          <a:bodyPr wrap="square" rtlCol="0">
-            <a:spAutoFit/>
-          </a:bodyPr>
-          <a:lstStyle/>
-          <a:p>
-            <a:pPr algn="ctr"/>
-            <a:r>
-              <a:rPr lang="ru-RU" dirty="0"/>
-              <a:t>1</a:t>
-            </a:r>
-          </a:p>
-        </p:txBody>
-      </p:sp>
-    </p:spTree>
-    <p:extLst>
-      <p:ext uri="{BB962C8B-B14F-4D97-AF65-F5344CB8AC3E}">
-        <p14:creationId xmlns:p14="http://schemas.microsoft.com/office/powerpoint/2010/main" val="899005541"/>
-      </p:ext>
-    </p:extLst>
-  </p:cSld>
-  <p:clrMapOvr>
-    <a:masterClrMapping/>
-  </p:clrMapOvr>
-</p:sld>
-</file>
-
-<file path=ppt/slides/slide20.xml><?xml version="1.0" encoding="utf-8"?>
+<file path=ppt/slides/slide21.xml><?xml version="1.0" encoding="utf-8"?>
 <p:sld xmlns:a="http://schemas.openxmlformats.org/drawingml/2006/main" xmlns:r="http://schemas.openxmlformats.org/officeDocument/2006/relationships" xmlns:p="http://schemas.openxmlformats.org/presentationml/2006/main">
   <p:cSld>
     <p:spTree>
@@ -8868,7 +9862,7 @@
 </p:sld>
 </file>
 
-<file path=ppt/slides/slide21.xml><?xml version="1.0" encoding="utf-8"?>
+<file path=ppt/slides/slide22.xml><?xml version="1.0" encoding="utf-8"?>
 <p:sld xmlns:a="http://schemas.openxmlformats.org/drawingml/2006/main" xmlns:r="http://schemas.openxmlformats.org/officeDocument/2006/relationships" xmlns:p="http://schemas.openxmlformats.org/presentationml/2006/main">
   <p:cSld>
     <p:spTree>
@@ -8970,7 +9964,7 @@
 </p:sld>
 </file>
 
-<file path=ppt/slides/slide22.xml><?xml version="1.0" encoding="utf-8"?>
+<file path=ppt/slides/slide23.xml><?xml version="1.0" encoding="utf-8"?>
 <p:sld xmlns:a="http://schemas.openxmlformats.org/drawingml/2006/main" xmlns:r="http://schemas.openxmlformats.org/officeDocument/2006/relationships" xmlns:p="http://schemas.openxmlformats.org/presentationml/2006/main">
   <p:cSld>
     <p:spTree>
@@ -9094,7 +10088,7 @@
           <p:cNvPr id="2" name="Заголовок 1">
             <a:extLst>
               <a:ext uri="{FF2B5EF4-FFF2-40B4-BE49-F238E27FC236}">
-                <a16:creationId xmlns:a16="http://schemas.microsoft.com/office/drawing/2014/main" id="{5C3D208E-29B6-0633-FDD9-7CB75B416567}"/>
+                <a16:creationId xmlns:a16="http://schemas.microsoft.com/office/drawing/2014/main" id="{C9DD5936-6EAC-559D-8450-8CFC714C675A}"/>
               </a:ext>
             </a:extLst>
           </p:cNvPr>
@@ -9112,175 +10106,63 @@
           <a:p>
             <a:r>
               <a:rPr lang="ru-RU" dirty="0"/>
-              <a:t>История и  Алгоритма Укконена</a:t>
+              <a:t>Формальная постановка задачи</a:t>
+            </a:r>
+            <a:r>
+              <a:rPr lang="en-US" dirty="0"/>
+              <a:t>:</a:t>
+            </a:r>
+            <a:br>
+              <a:rPr lang="ru-RU" dirty="0"/>
+            </a:br>
+            <a:r>
+              <a:rPr lang="en-US" dirty="0"/>
+              <a:t>Online </a:t>
+            </a:r>
+            <a:r>
+              <a:rPr lang="ru-RU" dirty="0"/>
+              <a:t>поиск подстрок в строке</a:t>
             </a:r>
           </a:p>
         </p:txBody>
       </p:sp>
-      <p:sp>
-        <p:nvSpPr>
-          <p:cNvPr id="3" name="Объект 2">
-            <a:extLst>
-              <a:ext uri="{FF2B5EF4-FFF2-40B4-BE49-F238E27FC236}">
-                <a16:creationId xmlns:a16="http://schemas.microsoft.com/office/drawing/2014/main" id="{0C00D144-24C2-2D46-F6A9-2B6F9098620D}"/>
-              </a:ext>
-            </a:extLst>
-          </p:cNvPr>
-          <p:cNvSpPr>
-            <a:spLocks noGrp="1"/>
-          </p:cNvSpPr>
+      <p:graphicFrame>
+        <p:nvGraphicFramePr>
+          <p:cNvPr id="5" name="Объект 2">
+            <a:extLst>
+              <a:ext uri="{FF2B5EF4-FFF2-40B4-BE49-F238E27FC236}">
+                <a16:creationId xmlns:a16="http://schemas.microsoft.com/office/drawing/2014/main" id="{F3E6998B-3003-2E24-E209-50A77B9023A6}"/>
+              </a:ext>
+            </a:extLst>
+          </p:cNvPr>
+          <p:cNvGraphicFramePr>
+            <a:graphicFrameLocks noGrp="1"/>
+          </p:cNvGraphicFramePr>
           <p:nvPr>
             <p:ph idx="1"/>
+            <p:extLst>
+              <p:ext uri="{D42A27DB-BD31-4B8C-83A1-F6EECF244321}">
+                <p14:modId xmlns:p14="http://schemas.microsoft.com/office/powerpoint/2010/main" val="3786040545"/>
+              </p:ext>
+            </p:extLst>
           </p:nvPr>
-        </p:nvSpPr>
-        <p:spPr/>
-        <p:txBody>
-          <a:bodyPr>
-            <a:normAutofit/>
-          </a:bodyPr>
-          <a:lstStyle/>
-          <a:p>
-            <a:pPr marL="0" indent="0">
-              <a:buNone/>
-            </a:pPr>
-            <a:r>
-              <a:rPr lang="ru-RU" sz="2000" b="1" i="0" dirty="0">
-                <a:solidFill>
-                  <a:srgbClr val="202122"/>
-                </a:solidFill>
-                <a:effectLst/>
-              </a:rPr>
-              <a:t>Эско Юхани </a:t>
-            </a:r>
-            <a:r>
-              <a:rPr lang="ru-RU" sz="2000" b="1" i="0" dirty="0" err="1">
-                <a:solidFill>
-                  <a:srgbClr val="202122"/>
-                </a:solidFill>
-                <a:effectLst/>
-              </a:rPr>
-              <a:t>Укконен</a:t>
-            </a:r>
-            <a:r>
-              <a:rPr lang="ru-RU" sz="2000" dirty="0"/>
-              <a:t> (р. 1950) - финский </a:t>
-            </a:r>
-            <a:r>
-              <a:rPr lang="ru-RU" sz="2000" b="0" i="0" u="none" strike="noStrike" dirty="0">
-                <a:solidFill>
-                  <a:srgbClr val="0645AD"/>
-                </a:solidFill>
-                <a:effectLst/>
-                <a:hlinkClick r:id="rId2" tooltip="Теоретическая информатика"/>
-              </a:rPr>
-              <a:t>ученый-теоретик информатики</a:t>
-            </a:r>
-            <a:r>
-              <a:rPr lang="ru-RU" sz="2000" dirty="0"/>
-              <a:t>, известный своим вкладом в </a:t>
-            </a:r>
-            <a:r>
-              <a:rPr lang="ru-RU" sz="2000" b="0" i="0" u="none" strike="noStrike" dirty="0">
-                <a:solidFill>
-                  <a:srgbClr val="0645AD"/>
-                </a:solidFill>
-                <a:effectLst/>
-                <a:hlinkClick r:id="rId3" tooltip="Строковые алгоритмы"/>
-              </a:rPr>
-              <a:t>строковые алгоритмы</a:t>
-            </a:r>
-            <a:r>
-              <a:rPr lang="ru-RU" sz="2000" dirty="0"/>
-              <a:t>, и в частности, алгоритмом </a:t>
-            </a:r>
-            <a:r>
-              <a:rPr lang="ru-RU" sz="2000" b="0" i="0" u="none" strike="noStrike" dirty="0">
-                <a:solidFill>
-                  <a:srgbClr val="0645AD"/>
-                </a:solidFill>
-                <a:effectLst/>
-                <a:hlinkClick r:id="rId4" tooltip="Алгоритм Укконена"/>
-              </a:rPr>
-              <a:t>Укконена</a:t>
-            </a:r>
-            <a:r>
-              <a:rPr lang="ru-RU" sz="2000" b="0" i="0" u="none" strike="noStrike" baseline="30000" dirty="0">
-                <a:solidFill>
-                  <a:srgbClr val="0645AD"/>
-                </a:solidFill>
-                <a:effectLst/>
-                <a:hlinkClick r:id="rId5"/>
-              </a:rPr>
-              <a:t>[1]</a:t>
-            </a:r>
-            <a:r>
-              <a:rPr lang="ru-RU" sz="2000" dirty="0"/>
-              <a:t> для построения </a:t>
-            </a:r>
-            <a:r>
-              <a:rPr lang="ru-RU" sz="2000" b="0" i="0" u="none" strike="noStrike" dirty="0">
-                <a:solidFill>
-                  <a:srgbClr val="0645AD"/>
-                </a:solidFill>
-                <a:effectLst/>
-                <a:hlinkClick r:id="rId6" tooltip="Дерево суффиксов"/>
-              </a:rPr>
-              <a:t>дерева суффиксов</a:t>
-            </a:r>
-            <a:r>
-              <a:rPr lang="ru-RU" sz="2000" b="0" i="0" u="none" strike="noStrike" dirty="0">
-                <a:solidFill>
-                  <a:srgbClr val="0645AD"/>
-                </a:solidFill>
-                <a:effectLst/>
-              </a:rPr>
-              <a:t> </a:t>
-            </a:r>
-            <a:r>
-              <a:rPr lang="ru-RU" sz="2000" b="0" i="0" u="none" strike="noStrike" dirty="0">
-                <a:effectLst/>
-              </a:rPr>
-              <a:t>предложенный им в 1995 году</a:t>
-            </a:r>
-            <a:r>
-              <a:rPr lang="ru-RU" sz="2000" dirty="0"/>
-              <a:t>. Он является почетным профессором </a:t>
-            </a:r>
-            <a:r>
-              <a:rPr lang="ru-RU" sz="2000" b="0" i="0" u="none" strike="noStrike" dirty="0">
-                <a:solidFill>
-                  <a:srgbClr val="0645AD"/>
-                </a:solidFill>
-                <a:effectLst/>
-                <a:hlinkClick r:id="rId7" tooltip="Хельсинкский университет"/>
-              </a:rPr>
-              <a:t>Хельсинкского университета</a:t>
-            </a:r>
-            <a:r>
-              <a:rPr lang="ru-RU" sz="2000" dirty="0"/>
-              <a:t>.</a:t>
-            </a:r>
-          </a:p>
-          <a:p>
-            <a:pPr marL="0" indent="0">
-              <a:buNone/>
-            </a:pPr>
-            <a:endParaRPr lang="ru-RU" sz="2000" dirty="0"/>
-          </a:p>
-          <a:p>
-            <a:pPr marL="0" indent="0">
-              <a:buNone/>
-            </a:pPr>
-            <a:endParaRPr lang="ru-RU" sz="2000" dirty="0"/>
-          </a:p>
-        </p:txBody>
-      </p:sp>
+        </p:nvGraphicFramePr>
+        <p:xfrm>
+          <a:off x="838200" y="1825625"/>
+          <a:ext cx="10515600" cy="4351338"/>
+        </p:xfrm>
+        <a:graphic>
+          <a:graphicData uri="http://schemas.openxmlformats.org/drawingml/2006/diagram">
+            <dgm:relIds xmlns:dgm="http://schemas.openxmlformats.org/drawingml/2006/diagram" xmlns:r="http://schemas.openxmlformats.org/officeDocument/2006/relationships" r:dm="rId2" r:lo="rId3" r:qs="rId4" r:cs="rId5"/>
+          </a:graphicData>
+        </a:graphic>
+      </p:graphicFrame>
       <p:sp>
         <p:nvSpPr>
           <p:cNvPr id="4" name="TextBox 3">
             <a:extLst>
               <a:ext uri="{FF2B5EF4-FFF2-40B4-BE49-F238E27FC236}">
-                <a16:creationId xmlns:a16="http://schemas.microsoft.com/office/drawing/2014/main" id="{7D76F9A8-2540-EEB1-715E-785F959B17C0}"/>
+                <a16:creationId xmlns:a16="http://schemas.microsoft.com/office/drawing/2014/main" id="{A5182898-B787-FE7E-5544-BC35C9D37D45}"/>
               </a:ext>
             </a:extLst>
           </p:cNvPr>
@@ -9306,89 +10188,7 @@
             <a:pPr algn="ctr"/>
             <a:r>
               <a:rPr lang="ru-RU" dirty="0"/>
-              <a:t>2</a:t>
-            </a:r>
-          </a:p>
-        </p:txBody>
-      </p:sp>
-      <p:pic>
-        <p:nvPicPr>
-          <p:cNvPr id="1028" name="Picture 4">
-            <a:extLst>
-              <a:ext uri="{FF2B5EF4-FFF2-40B4-BE49-F238E27FC236}">
-                <a16:creationId xmlns:a16="http://schemas.microsoft.com/office/drawing/2014/main" id="{A052091C-4FFB-E513-3328-D24DDFD2741A}"/>
-              </a:ext>
-            </a:extLst>
-          </p:cNvPr>
-          <p:cNvPicPr>
-            <a:picLocks noChangeAspect="1" noChangeArrowheads="1"/>
-          </p:cNvPicPr>
-          <p:nvPr/>
-        </p:nvPicPr>
-        <p:blipFill>
-          <a:blip r:embed="rId8">
-            <a:extLst>
-              <a:ext uri="{28A0092B-C50C-407E-A947-70E740481C1C}">
-                <a14:useLocalDpi xmlns:a14="http://schemas.microsoft.com/office/drawing/2010/main" val="0"/>
-              </a:ext>
-            </a:extLst>
-          </a:blip>
-          <a:srcRect/>
-          <a:stretch>
-            <a:fillRect/>
-          </a:stretch>
-        </p:blipFill>
-        <p:spPr bwMode="auto">
-          <a:xfrm>
-            <a:off x="949912" y="3041153"/>
-            <a:ext cx="4432998" cy="3069982"/>
-          </a:xfrm>
-          <a:prstGeom prst="rect">
-            <a:avLst/>
-          </a:prstGeom>
-          <a:noFill/>
-          <a:extLst>
-            <a:ext uri="{909E8E84-426E-40DD-AFC4-6F175D3DCCD1}">
-              <a14:hiddenFill xmlns:a14="http://schemas.microsoft.com/office/drawing/2010/main">
-                <a:solidFill>
-                  <a:srgbClr val="FFFFFF"/>
-                </a:solidFill>
-              </a14:hiddenFill>
-            </a:ext>
-          </a:extLst>
-        </p:spPr>
-      </p:pic>
-      <p:sp>
-        <p:nvSpPr>
-          <p:cNvPr id="5" name="TextBox 4">
-            <a:extLst>
-              <a:ext uri="{FF2B5EF4-FFF2-40B4-BE49-F238E27FC236}">
-                <a16:creationId xmlns:a16="http://schemas.microsoft.com/office/drawing/2014/main" id="{958B18CB-12AC-D896-3527-4EFF0E9E3C55}"/>
-              </a:ext>
-            </a:extLst>
-          </p:cNvPr>
-          <p:cNvSpPr txBox="1"/>
-          <p:nvPr/>
-        </p:nvSpPr>
-        <p:spPr>
-          <a:xfrm>
-            <a:off x="6096000" y="3701988"/>
-            <a:ext cx="1378998" cy="369332"/>
-          </a:xfrm>
-          <a:prstGeom prst="rect">
-            <a:avLst/>
-          </a:prstGeom>
-          <a:noFill/>
-        </p:spPr>
-        <p:txBody>
-          <a:bodyPr wrap="square" rtlCol="0">
-            <a:spAutoFit/>
-          </a:bodyPr>
-          <a:lstStyle/>
-          <a:p>
-            <a:r>
-              <a:rPr lang="ru-RU" dirty="0"/>
-              <a:t>	</a:t>
+              <a:t>1</a:t>
             </a:r>
           </a:p>
         </p:txBody>
@@ -9396,7 +10196,7 @@
     </p:spTree>
     <p:extLst>
       <p:ext uri="{BB962C8B-B14F-4D97-AF65-F5344CB8AC3E}">
-        <p14:creationId xmlns:p14="http://schemas.microsoft.com/office/powerpoint/2010/main" val="4134274443"/>
+        <p14:creationId xmlns:p14="http://schemas.microsoft.com/office/powerpoint/2010/main" val="899005541"/>
       </p:ext>
     </p:extLst>
   </p:cSld>

</xml_diff>